<commit_message>
Cambio de nombre escaleta tema 11 mat 7
</commit_message>
<xml_diff>
--- a/fuentes/contenidos/grado09/guion04/MapaConceptual_MA_09_04_CO.pptx
+++ b/fuentes/contenidos/grado09/guion04/MapaConceptual_MA_09_04_CO.pptx
@@ -1345,7 +1345,7 @@
         </p:nvSpPr>
         <p:spPr>
           <a:xfrm>
-            <a:off x="420726" y="3017631"/>
+            <a:off x="867321" y="2825017"/>
             <a:ext cx="736890" cy="230832"/>
           </a:xfrm>
           <a:prstGeom prst="rect">
@@ -1382,7 +1382,7 @@
         </p:nvSpPr>
         <p:spPr>
           <a:xfrm>
-            <a:off x="274531" y="3776404"/>
+            <a:off x="408733" y="3187994"/>
             <a:ext cx="1027559" cy="343441"/>
           </a:xfrm>
           <a:prstGeom prst="rect">
@@ -1466,16 +1466,14 @@
         </p:nvSpPr>
         <p:spPr>
           <a:xfrm>
-            <a:off x="1075166" y="3350748"/>
+            <a:off x="413620" y="4949251"/>
             <a:ext cx="1336511" cy="353519"/>
           </a:xfrm>
           <a:prstGeom prst="rect">
             <a:avLst/>
           </a:prstGeom>
           <a:solidFill>
-            <a:schemeClr val="bg2">
-              <a:lumMod val="90000"/>
-            </a:schemeClr>
+            <a:schemeClr val="bg1"/>
           </a:solidFill>
           <a:ln>
             <a:solidFill>
@@ -1520,17 +1518,7 @@
                 <a:latin typeface="Arial" panose="020B0604020202020204" pitchFamily="34" charset="0"/>
                 <a:cs typeface="Arial" panose="020B0604020202020204" pitchFamily="34" charset="0"/>
               </a:rPr>
-              <a:t>unciones por </a:t>
-            </a:r>
-            <a:r>
-              <a:rPr lang="es-ES" sz="900" dirty="0">
-                <a:solidFill>
-                  <a:schemeClr val="tx1"/>
-                </a:solidFill>
-                <a:latin typeface="Arial" panose="020B0604020202020204" pitchFamily="34" charset="0"/>
-                <a:cs typeface="Arial" panose="020B0604020202020204" pitchFamily="34" charset="0"/>
-              </a:rPr>
-              <a:t>trozos</a:t>
+              <a:t>unciones por trozos</a:t>
             </a:r>
           </a:p>
           <a:p>
@@ -1543,32 +1531,49 @@
                 <a:latin typeface="Arial" panose="020B0604020202020204" pitchFamily="34" charset="0"/>
                 <a:cs typeface="Arial" panose="020B0604020202020204" pitchFamily="34" charset="0"/>
               </a:rPr>
-              <a:t>o </a:t>
-            </a:r>
-            <a:r>
-              <a:rPr lang="es-ES" sz="900" dirty="0" smtClean="0">
-                <a:solidFill>
-                  <a:schemeClr val="tx1"/>
-                </a:solidFill>
-                <a:latin typeface="Arial" panose="020B0604020202020204" pitchFamily="34" charset="0"/>
-                <a:cs typeface="Arial" panose="020B0604020202020204" pitchFamily="34" charset="0"/>
-              </a:rPr>
-              <a:t>funciones </a:t>
-            </a:r>
-            <a:r>
-              <a:rPr lang="es-ES" sz="900" dirty="0" smtClean="0">
-                <a:solidFill>
-                  <a:schemeClr val="tx1"/>
-                </a:solidFill>
-                <a:latin typeface="Arial" panose="020B0604020202020204" pitchFamily="34" charset="0"/>
-                <a:cs typeface="Arial" panose="020B0604020202020204" pitchFamily="34" charset="0"/>
-              </a:rPr>
-              <a:t>por partes</a:t>
+              <a:t>o por funciones partes</a:t>
             </a:r>
             <a:endParaRPr lang="es-ES" sz="900" dirty="0">
               <a:solidFill>
                 <a:schemeClr val="tx1"/>
               </a:solidFill>
+              <a:latin typeface="Arial" panose="020B0604020202020204" pitchFamily="34" charset="0"/>
+              <a:cs typeface="Arial" panose="020B0604020202020204" pitchFamily="34" charset="0"/>
+            </a:endParaRPr>
+          </a:p>
+        </p:txBody>
+      </p:sp>
+      <p:sp>
+        <p:nvSpPr>
+          <p:cNvPr id="75" name="CuadroTexto 74" descr="Conector entre nodos" title="conector"/>
+          <p:cNvSpPr txBox="1"/>
+          <p:nvPr/>
+        </p:nvSpPr>
+        <p:spPr>
+          <a:xfrm>
+            <a:off x="711613" y="4024263"/>
+            <a:ext cx="746952" cy="230832"/>
+          </a:xfrm>
+          <a:prstGeom prst="rect">
+            <a:avLst/>
+          </a:prstGeom>
+          <a:noFill/>
+        </p:spPr>
+        <p:txBody>
+          <a:bodyPr wrap="square" rtlCol="0">
+            <a:spAutoFit/>
+          </a:bodyPr>
+          <a:lstStyle/>
+          <a:p>
+            <a:pPr algn="ctr"/>
+            <a:r>
+              <a:rPr lang="es-ES" sz="900" dirty="0" smtClean="0">
+                <a:latin typeface="Arial" panose="020B0604020202020204" pitchFamily="34" charset="0"/>
+                <a:cs typeface="Arial" panose="020B0604020202020204" pitchFamily="34" charset="0"/>
+              </a:rPr>
+              <a:t>se definen    </a:t>
+            </a:r>
+            <a:endParaRPr lang="es-ES" sz="900" dirty="0">
               <a:latin typeface="Arial" panose="020B0604020202020204" pitchFamily="34" charset="0"/>
               <a:cs typeface="Arial" panose="020B0604020202020204" pitchFamily="34" charset="0"/>
             </a:endParaRPr>
@@ -1825,7 +1830,7 @@
         </p:nvSpPr>
         <p:spPr>
           <a:xfrm>
-            <a:off x="349530" y="4453255"/>
+            <a:off x="1529253" y="3189056"/>
             <a:ext cx="866042" cy="472056"/>
           </a:xfrm>
           <a:prstGeom prst="rect">
@@ -3554,7 +3559,17 @@
                 <a:latin typeface="Arial" panose="020B0604020202020204" pitchFamily="34" charset="0"/>
                 <a:cs typeface="Arial" panose="020B0604020202020204" pitchFamily="34" charset="0"/>
               </a:rPr>
-              <a:t>- decreciente - constante</a:t>
+              <a:t>- d</a:t>
+            </a:r>
+            <a:r>
+              <a:rPr lang="es-ES" sz="900" dirty="0" smtClean="0">
+                <a:solidFill>
+                  <a:schemeClr val="tx1"/>
+                </a:solidFill>
+                <a:latin typeface="Arial" panose="020B0604020202020204" pitchFamily="34" charset="0"/>
+                <a:cs typeface="Arial" panose="020B0604020202020204" pitchFamily="34" charset="0"/>
+              </a:rPr>
+              <a:t>ecreciente - constante</a:t>
             </a:r>
             <a:endParaRPr lang="es-ES" sz="900" dirty="0">
               <a:solidFill>
@@ -3615,7 +3630,17 @@
                 <a:latin typeface="Arial" panose="020B0604020202020204" pitchFamily="34" charset="0"/>
                 <a:cs typeface="Arial" panose="020B0604020202020204" pitchFamily="34" charset="0"/>
               </a:rPr>
-              <a:t>- máximo relativo</a:t>
+              <a:t>- má</a:t>
+            </a:r>
+            <a:r>
+              <a:rPr lang="es-ES" sz="900" dirty="0" smtClean="0">
+                <a:solidFill>
+                  <a:schemeClr val="tx1"/>
+                </a:solidFill>
+                <a:latin typeface="Arial" panose="020B0604020202020204" pitchFamily="34" charset="0"/>
+                <a:cs typeface="Arial" panose="020B0604020202020204" pitchFamily="34" charset="0"/>
+              </a:rPr>
+              <a:t>ximo relativo</a:t>
             </a:r>
           </a:p>
           <a:p>
@@ -4478,6 +4503,84 @@
       </p:cxnSp>
       <p:cxnSp>
         <p:nvCxnSpPr>
+          <p:cNvPr id="46" name="Conector recto 45"/>
+          <p:cNvCxnSpPr>
+            <a:stCxn id="44" idx="2"/>
+            <a:endCxn id="67" idx="0"/>
+          </p:cNvCxnSpPr>
+          <p:nvPr/>
+        </p:nvCxnSpPr>
+        <p:spPr>
+          <a:xfrm flipH="1">
+            <a:off x="1235766" y="2701847"/>
+            <a:ext cx="1367" cy="123170"/>
+          </a:xfrm>
+          <a:prstGeom prst="line">
+            <a:avLst/>
+          </a:prstGeom>
+          <a:ln>
+            <a:solidFill>
+              <a:schemeClr val="tx1"/>
+            </a:solidFill>
+          </a:ln>
+        </p:spPr>
+        <p:style>
+          <a:lnRef idx="1">
+            <a:schemeClr val="accent1"/>
+          </a:lnRef>
+          <a:fillRef idx="0">
+            <a:schemeClr val="accent1"/>
+          </a:fillRef>
+          <a:effectRef idx="0">
+            <a:schemeClr val="accent1"/>
+          </a:effectRef>
+          <a:fontRef idx="minor">
+            <a:schemeClr val="tx1"/>
+          </a:fontRef>
+        </p:style>
+      </p:cxnSp>
+      <p:cxnSp>
+        <p:nvCxnSpPr>
+          <p:cNvPr id="49" name="Conector angular 48"/>
+          <p:cNvCxnSpPr>
+            <a:stCxn id="67" idx="2"/>
+            <a:endCxn id="128" idx="0"/>
+          </p:cNvCxnSpPr>
+          <p:nvPr/>
+        </p:nvCxnSpPr>
+        <p:spPr>
+          <a:xfrm rot="16200000" flipH="1">
+            <a:off x="1532417" y="2759198"/>
+            <a:ext cx="133207" cy="726508"/>
+          </a:xfrm>
+          <a:prstGeom prst="bentConnector3">
+            <a:avLst>
+              <a:gd name="adj1" fmla="val 50000"/>
+            </a:avLst>
+          </a:prstGeom>
+          <a:ln>
+            <a:solidFill>
+              <a:schemeClr val="tx1"/>
+            </a:solidFill>
+          </a:ln>
+        </p:spPr>
+        <p:style>
+          <a:lnRef idx="1">
+            <a:schemeClr val="accent1"/>
+          </a:lnRef>
+          <a:fillRef idx="0">
+            <a:schemeClr val="accent1"/>
+          </a:fillRef>
+          <a:effectRef idx="0">
+            <a:schemeClr val="accent1"/>
+          </a:effectRef>
+          <a:fontRef idx="minor">
+            <a:schemeClr val="tx1"/>
+          </a:fontRef>
+        </p:style>
+      </p:cxnSp>
+      <p:cxnSp>
+        <p:nvCxnSpPr>
           <p:cNvPr id="51" name="Conector angular 50"/>
           <p:cNvCxnSpPr>
             <a:stCxn id="67" idx="2"/>
@@ -4487,10 +4590,48 @@
         </p:nvCxnSpPr>
         <p:spPr>
           <a:xfrm rot="5400000">
-            <a:off x="524771" y="3512003"/>
-            <a:ext cx="527941" cy="860"/>
+            <a:off x="1013068" y="2965295"/>
+            <a:ext cx="132145" cy="313253"/>
           </a:xfrm>
           <a:prstGeom prst="bentConnector3">
+            <a:avLst/>
+          </a:prstGeom>
+          <a:ln>
+            <a:solidFill>
+              <a:schemeClr val="tx1"/>
+            </a:solidFill>
+          </a:ln>
+        </p:spPr>
+        <p:style>
+          <a:lnRef idx="1">
+            <a:schemeClr val="accent1"/>
+          </a:lnRef>
+          <a:fillRef idx="0">
+            <a:schemeClr val="accent1"/>
+          </a:fillRef>
+          <a:effectRef idx="0">
+            <a:schemeClr val="accent1"/>
+          </a:effectRef>
+          <a:fontRef idx="minor">
+            <a:schemeClr val="tx1"/>
+          </a:fontRef>
+        </p:style>
+      </p:cxnSp>
+      <p:cxnSp>
+        <p:nvCxnSpPr>
+          <p:cNvPr id="87" name="Conector recto 86"/>
+          <p:cNvCxnSpPr>
+            <a:stCxn id="75" idx="2"/>
+            <a:endCxn id="73" idx="0"/>
+          </p:cNvCxnSpPr>
+          <p:nvPr/>
+        </p:nvCxnSpPr>
+        <p:spPr>
+          <a:xfrm flipH="1">
+            <a:off x="1081876" y="4255095"/>
+            <a:ext cx="3213" cy="694156"/>
+          </a:xfrm>
+          <a:prstGeom prst="line">
             <a:avLst/>
           </a:prstGeom>
           <a:ln>
@@ -5927,96 +6068,23 @@
           </a:fontRef>
         </p:style>
       </p:cxnSp>
-      <p:sp>
-        <p:nvSpPr>
-          <p:cNvPr id="109" name="CuadroTexto 108" descr="Conector entre nodos" title="conector"/>
-          <p:cNvSpPr txBox="1"/>
-          <p:nvPr/>
-        </p:nvSpPr>
-        <p:spPr>
-          <a:xfrm>
-            <a:off x="1366684" y="3005439"/>
-            <a:ext cx="746952" cy="230832"/>
-          </a:xfrm>
-          <a:prstGeom prst="rect">
-            <a:avLst/>
-          </a:prstGeom>
-          <a:noFill/>
-        </p:spPr>
-        <p:txBody>
-          <a:bodyPr wrap="square" rtlCol="0">
-            <a:spAutoFit/>
-          </a:bodyPr>
-          <a:lstStyle/>
-          <a:p>
-            <a:pPr algn="ctr"/>
-            <a:r>
-              <a:rPr lang="es-ES" sz="900" dirty="0" smtClean="0">
-                <a:latin typeface="Arial" panose="020B0604020202020204" pitchFamily="34" charset="0"/>
-                <a:cs typeface="Arial" panose="020B0604020202020204" pitchFamily="34" charset="0"/>
-              </a:rPr>
-              <a:t>se definen    </a:t>
-            </a:r>
-            <a:endParaRPr lang="es-ES" sz="900" dirty="0">
-              <a:latin typeface="Arial" panose="020B0604020202020204" pitchFamily="34" charset="0"/>
-              <a:cs typeface="Arial" panose="020B0604020202020204" pitchFamily="34" charset="0"/>
-            </a:endParaRPr>
-          </a:p>
-        </p:txBody>
-      </p:sp>
-      <p:sp>
-        <p:nvSpPr>
-          <p:cNvPr id="120" name="CuadroTexto 119" descr="Conector entre nodos" title="conector"/>
-          <p:cNvSpPr txBox="1"/>
-          <p:nvPr/>
-        </p:nvSpPr>
-        <p:spPr>
-          <a:xfrm>
-            <a:off x="649282" y="4176715"/>
-            <a:ext cx="268028" cy="230832"/>
-          </a:xfrm>
-          <a:prstGeom prst="rect">
-            <a:avLst/>
-          </a:prstGeom>
-          <a:noFill/>
-        </p:spPr>
-        <p:txBody>
-          <a:bodyPr wrap="square" rtlCol="0">
-            <a:spAutoFit/>
-          </a:bodyPr>
-          <a:lstStyle/>
-          <a:p>
-            <a:pPr algn="ctr"/>
-            <a:r>
-              <a:rPr lang="es-ES" sz="900" dirty="0" smtClean="0">
-                <a:latin typeface="Arial" panose="020B0604020202020204" pitchFamily="34" charset="0"/>
-                <a:cs typeface="Arial" panose="020B0604020202020204" pitchFamily="34" charset="0"/>
-              </a:rPr>
-              <a:t>y</a:t>
-            </a:r>
-            <a:endParaRPr lang="es-ES" sz="900" dirty="0">
-              <a:latin typeface="Arial" panose="020B0604020202020204" pitchFamily="34" charset="0"/>
-              <a:cs typeface="Arial" panose="020B0604020202020204" pitchFamily="34" charset="0"/>
-            </a:endParaRPr>
-          </a:p>
-        </p:txBody>
-      </p:sp>
       <p:cxnSp>
         <p:nvCxnSpPr>
-          <p:cNvPr id="28" name="Conector recto 27"/>
+          <p:cNvPr id="539" name="Conector angular 538"/>
           <p:cNvCxnSpPr>
-            <a:stCxn id="72" idx="2"/>
-            <a:endCxn id="120" idx="0"/>
+            <a:endCxn id="75" idx="0"/>
           </p:cNvCxnSpPr>
           <p:nvPr/>
         </p:nvCxnSpPr>
         <p:spPr>
-          <a:xfrm flipH="1">
-            <a:off x="783296" y="4119845"/>
-            <a:ext cx="5015" cy="56870"/>
-          </a:xfrm>
-          <a:prstGeom prst="line">
-            <a:avLst/>
+          <a:xfrm rot="16200000" flipH="1">
+            <a:off x="762145" y="3701318"/>
+            <a:ext cx="483313" cy="162576"/>
+          </a:xfrm>
+          <a:prstGeom prst="bentConnector3">
+            <a:avLst>
+              <a:gd name="adj1" fmla="val 60064"/>
+            </a:avLst>
           </a:prstGeom>
           <a:ln>
             <a:solidFill>
@@ -6041,134 +6109,22 @@
       </p:cxnSp>
       <p:cxnSp>
         <p:nvCxnSpPr>
-          <p:cNvPr id="30" name="Conector recto 29"/>
+          <p:cNvPr id="554" name="Conector angular 553"/>
           <p:cNvCxnSpPr>
-            <a:stCxn id="120" idx="2"/>
-            <a:endCxn id="128" idx="0"/>
+            <a:stCxn id="128" idx="2"/>
+            <a:endCxn id="75" idx="0"/>
           </p:cNvCxnSpPr>
           <p:nvPr/>
         </p:nvCxnSpPr>
         <p:spPr>
-          <a:xfrm flipH="1">
-            <a:off x="782551" y="4407547"/>
-            <a:ext cx="745" cy="45708"/>
-          </a:xfrm>
-          <a:prstGeom prst="line">
-            <a:avLst/>
-          </a:prstGeom>
-          <a:ln>
-            <a:solidFill>
-              <a:schemeClr val="tx1"/>
-            </a:solidFill>
-          </a:ln>
-        </p:spPr>
-        <p:style>
-          <a:lnRef idx="1">
-            <a:schemeClr val="accent1"/>
-          </a:lnRef>
-          <a:fillRef idx="0">
-            <a:schemeClr val="accent1"/>
-          </a:fillRef>
-          <a:effectRef idx="0">
-            <a:schemeClr val="accent1"/>
-          </a:effectRef>
-          <a:fontRef idx="minor">
-            <a:schemeClr val="tx1"/>
-          </a:fontRef>
-        </p:style>
-      </p:cxnSp>
-      <p:cxnSp>
-        <p:nvCxnSpPr>
-          <p:cNvPr id="33" name="Conector angular 32"/>
-          <p:cNvCxnSpPr>
-            <a:stCxn id="44" idx="2"/>
-            <a:endCxn id="67" idx="0"/>
-          </p:cNvCxnSpPr>
-          <p:nvPr/>
-        </p:nvCxnSpPr>
-        <p:spPr>
           <a:xfrm rot="5400000">
-            <a:off x="855260" y="2635758"/>
-            <a:ext cx="315784" cy="447962"/>
+            <a:off x="1342107" y="3404095"/>
+            <a:ext cx="363151" cy="877185"/>
           </a:xfrm>
           <a:prstGeom prst="bentConnector3">
-            <a:avLst/>
-          </a:prstGeom>
-          <a:ln>
-            <a:solidFill>
-              <a:schemeClr val="tx1"/>
-            </a:solidFill>
-          </a:ln>
-        </p:spPr>
-        <p:style>
-          <a:lnRef idx="1">
-            <a:schemeClr val="accent1"/>
-          </a:lnRef>
-          <a:fillRef idx="0">
-            <a:schemeClr val="accent1"/>
-          </a:fillRef>
-          <a:effectRef idx="0">
-            <a:schemeClr val="accent1"/>
-          </a:effectRef>
-          <a:fontRef idx="minor">
-            <a:schemeClr val="tx1"/>
-          </a:fontRef>
-        </p:style>
-      </p:cxnSp>
-      <p:cxnSp>
-        <p:nvCxnSpPr>
-          <p:cNvPr id="35" name="Conector angular 34"/>
-          <p:cNvCxnSpPr>
-            <a:stCxn id="44" idx="2"/>
-            <a:endCxn id="109" idx="0"/>
-          </p:cNvCxnSpPr>
-          <p:nvPr/>
-        </p:nvCxnSpPr>
-        <p:spPr>
-          <a:xfrm rot="16200000" flipH="1">
-            <a:off x="1336850" y="2602129"/>
-            <a:ext cx="303592" cy="503027"/>
-          </a:xfrm>
-          <a:prstGeom prst="bentConnector3">
-            <a:avLst/>
-          </a:prstGeom>
-          <a:ln>
-            <a:solidFill>
-              <a:schemeClr val="tx1"/>
-            </a:solidFill>
-          </a:ln>
-        </p:spPr>
-        <p:style>
-          <a:lnRef idx="1">
-            <a:schemeClr val="accent1"/>
-          </a:lnRef>
-          <a:fillRef idx="0">
-            <a:schemeClr val="accent1"/>
-          </a:fillRef>
-          <a:effectRef idx="0">
-            <a:schemeClr val="accent1"/>
-          </a:effectRef>
-          <a:fontRef idx="minor">
-            <a:schemeClr val="tx1"/>
-          </a:fontRef>
-        </p:style>
-      </p:cxnSp>
-      <p:cxnSp>
-        <p:nvCxnSpPr>
-          <p:cNvPr id="38" name="Conector recto 37"/>
-          <p:cNvCxnSpPr>
-            <a:stCxn id="109" idx="2"/>
-            <a:endCxn id="73" idx="0"/>
-          </p:cNvCxnSpPr>
-          <p:nvPr/>
-        </p:nvCxnSpPr>
-        <p:spPr>
-          <a:xfrm>
-            <a:off x="1740160" y="3236271"/>
-            <a:ext cx="3262" cy="114477"/>
-          </a:xfrm>
-          <a:prstGeom prst="line">
-            <a:avLst/>
+            <a:avLst>
+              <a:gd name="adj1" fmla="val 47321"/>
+            </a:avLst>
           </a:prstGeom>
           <a:ln>
             <a:solidFill>

</xml_diff>